<commit_message>
Amend to use file-like object suitable for containerization.
</commit_message>
<xml_diff>
--- a/src/template_pptx.pptx
+++ b/src/template_pptx.pptx
@@ -1,6 +1,6 @@
 
 <file path=ppt/presentation.xml><?xml version="1.0" encoding="utf-8"?>
-<p:presentation xmlns:a="http://schemas.openxmlformats.org/drawingml/2006/main" xmlns:r="http://schemas.openxmlformats.org/officeDocument/2006/relationships" xmlns:p="http://schemas.openxmlformats.org/presentationml/2006/main" saveSubsetFonts="1" autoCompressPictures="0">
+<p:presentation xmlns:a="http://schemas.openxmlformats.org/drawingml/2006/main" xmlns:r="http://schemas.openxmlformats.org/officeDocument/2006/relationships" xmlns:p="http://schemas.openxmlformats.org/presentationml/2006/main" showSpecialPlsOnTitleSld="0" saveSubsetFonts="1" autoCompressPictures="0">
   <p:sldMasterIdLst>
     <p:sldMasterId id="2147483648" r:id="rId1"/>
   </p:sldMasterIdLst>
@@ -214,7 +214,7 @@
           <a:p>
             <a:fld id="{F40D7C5C-6355-4C9D-9C7D-210C1C707F42}" type="datetimeFigureOut">
               <a:rPr lang="cs-CZ" smtClean="0"/>
-              <a:t>11.01.2025</a:t>
+              <a:t>12.01.2025</a:t>
             </a:fld>
             <a:endParaRPr lang="cs-CZ"/>
           </a:p>
@@ -379,7 +379,7 @@
           <a:p>
             <a:fld id="{72983E5B-CD27-4767-AFAF-9AFAECEA9549}" type="datetimeFigureOut">
               <a:rPr lang="cs-CZ" smtClean="0"/>
-              <a:t>11.01.2025</a:t>
+              <a:t>12.01.2025</a:t>
             </a:fld>
             <a:endParaRPr lang="cs-CZ"/>
           </a:p>
@@ -1654,7 +1654,7 @@
             </a:lvl1pPr>
           </a:lstStyle>
           <a:p>
-            <a:fld id="{2A44991F-0C9F-4FA0-AE56-3FF19DFA3178}" type="slidenum">
+            <a:fld id="{6425F62E-3AC8-4EF7-8DB0-CAD135662216}" type="slidenum">
               <a:rPr lang="cs-CZ" smtClean="0"/>
               <a:pPr/>
               <a:t>‹#›</a:t>

</xml_diff>